<commit_message>
Final touches in presentation of Temperature Project
</commit_message>
<xml_diff>
--- a/Presentations/TemperatureProj.pptx
+++ b/Presentations/TemperatureProj.pptx
@@ -303,7 +303,7 @@
             <a:fld id="{87DE6118-2437-4B30-8E3C-4D2BE6020583}" type="datetimeFigureOut">
               <a:rPr lang="en-US" dirty="0"/>
               <a:pPr/>
-              <a:t>7/22/20</a:t>
+              <a:t>7/23/20</a:t>
             </a:fld>
             <a:endParaRPr lang="en-US" dirty="0"/>
           </a:p>
@@ -629,7 +629,7 @@
           <a:p>
             <a:fld id="{87DE6118-2437-4B30-8E3C-4D2BE6020583}" type="datetimeFigureOut">
               <a:rPr lang="en-US" dirty="0"/>
-              <a:t>7/22/20</a:t>
+              <a:t>7/23/20</a:t>
             </a:fld>
             <a:endParaRPr lang="en-US" dirty="0"/>
           </a:p>
@@ -804,7 +804,7 @@
           <a:p>
             <a:fld id="{87DE6118-2437-4B30-8E3C-4D2BE6020583}" type="datetimeFigureOut">
               <a:rPr lang="en-US" dirty="0"/>
-              <a:t>7/22/20</a:t>
+              <a:t>7/23/20</a:t>
             </a:fld>
             <a:endParaRPr lang="en-US" dirty="0"/>
           </a:p>
@@ -969,7 +969,7 @@
           <a:p>
             <a:fld id="{87DE6118-2437-4B30-8E3C-4D2BE6020583}" type="datetimeFigureOut">
               <a:rPr lang="en-US" dirty="0"/>
-              <a:t>7/22/20</a:t>
+              <a:t>7/23/20</a:t>
             </a:fld>
             <a:endParaRPr lang="en-US" dirty="0"/>
           </a:p>
@@ -1242,7 +1242,7 @@
             <a:fld id="{87DE6118-2437-4B30-8E3C-4D2BE6020583}" type="datetimeFigureOut">
               <a:rPr lang="en-US" dirty="0"/>
               <a:pPr/>
-              <a:t>7/22/20</a:t>
+              <a:t>7/23/20</a:t>
             </a:fld>
             <a:endParaRPr lang="en-US" dirty="0"/>
           </a:p>
@@ -1632,7 +1632,7 @@
           <a:p>
             <a:fld id="{87DE6118-2437-4B30-8E3C-4D2BE6020583}" type="datetimeFigureOut">
               <a:rPr lang="en-US" dirty="0"/>
-              <a:t>7/22/20</a:t>
+              <a:t>7/23/20</a:t>
             </a:fld>
             <a:endParaRPr lang="en-US" dirty="0"/>
           </a:p>
@@ -2104,7 +2104,7 @@
           <a:p>
             <a:fld id="{87DE6118-2437-4B30-8E3C-4D2BE6020583}" type="datetimeFigureOut">
               <a:rPr lang="en-US" dirty="0"/>
-              <a:t>7/22/20</a:t>
+              <a:t>7/23/20</a:t>
             </a:fld>
             <a:endParaRPr lang="en-US" dirty="0"/>
           </a:p>
@@ -2217,7 +2217,7 @@
           <a:p>
             <a:fld id="{87DE6118-2437-4B30-8E3C-4D2BE6020583}" type="datetimeFigureOut">
               <a:rPr lang="en-US" dirty="0"/>
-              <a:t>7/22/20</a:t>
+              <a:t>7/23/20</a:t>
             </a:fld>
             <a:endParaRPr lang="en-US" dirty="0"/>
           </a:p>
@@ -2307,7 +2307,7 @@
           <a:p>
             <a:fld id="{87DE6118-2437-4B30-8E3C-4D2BE6020583}" type="datetimeFigureOut">
               <a:rPr lang="en-US" dirty="0"/>
-              <a:t>7/22/20</a:t>
+              <a:t>7/23/20</a:t>
             </a:fld>
             <a:endParaRPr lang="en-US" dirty="0"/>
           </a:p>
@@ -2649,7 +2649,7 @@
             <a:fld id="{87DE6118-2437-4B30-8E3C-4D2BE6020583}" type="datetimeFigureOut">
               <a:rPr lang="en-US" dirty="0"/>
               <a:pPr/>
-              <a:t>7/22/20</a:t>
+              <a:t>7/23/20</a:t>
             </a:fld>
             <a:endParaRPr lang="en-US" dirty="0"/>
           </a:p>
@@ -3034,7 +3034,7 @@
             <a:fld id="{87DE6118-2437-4B30-8E3C-4D2BE6020583}" type="datetimeFigureOut">
               <a:rPr lang="en-US" dirty="0"/>
               <a:pPr/>
-              <a:t>7/22/20</a:t>
+              <a:t>7/23/20</a:t>
             </a:fld>
             <a:endParaRPr lang="en-US" dirty="0"/>
           </a:p>
@@ -3309,7 +3309,7 @@
             <a:fld id="{87DE6118-2437-4B30-8E3C-4D2BE6020583}" type="datetimeFigureOut">
               <a:rPr lang="en-US" dirty="0"/>
               <a:pPr/>
-              <a:t>7/22/20</a:t>
+              <a:t>7/23/20</a:t>
             </a:fld>
             <a:endParaRPr lang="en-US" dirty="0"/>
           </a:p>
@@ -4035,10 +4035,15 @@
             <p:ph idx="1"/>
           </p:nvPr>
         </p:nvSpPr>
-        <p:spPr/>
+        <p:spPr>
+          <a:xfrm>
+            <a:off x="1371600" y="1597152"/>
+            <a:ext cx="9601200" cy="4428744"/>
+          </a:xfrm>
+        </p:spPr>
         <p:txBody>
           <a:bodyPr>
-            <a:normAutofit fontScale="92500" lnSpcReduction="10000"/>
+            <a:normAutofit/>
           </a:bodyPr>
           <a:lstStyle/>
           <a:p>
@@ -4070,22 +4075,26 @@
           <a:p>
             <a:pPr lvl="1"/>
             <a:r>
-              <a:rPr lang="en-US" dirty="0" err="1"/>
+              <a:rPr lang="en-US" b="1" i="0" dirty="0" err="1"/>
               <a:t>RandomC</a:t>
             </a:r>
             <a:r>
-              <a:rPr lang="en-US" dirty="0"/>
-              <a:t>: to generate temperature</a:t>
-            </a:r>
-          </a:p>
-          <a:p>
-            <a:pPr lvl="1"/>
-            <a:r>
-              <a:rPr lang="en-US" dirty="0" err="1"/>
+              <a:rPr lang="en-US" b="1" i="0" dirty="0"/>
+              <a:t>: </a:t>
+            </a:r>
+            <a:r>
+              <a:rPr lang="en-US" i="0" dirty="0"/>
+              <a:t>to generate temperature</a:t>
+            </a:r>
+          </a:p>
+          <a:p>
+            <a:pPr lvl="1"/>
+            <a:r>
+              <a:rPr lang="en-US" b="1" i="0" dirty="0" err="1"/>
               <a:t>TimerMilliC</a:t>
             </a:r>
             <a:r>
-              <a:rPr lang="en-US" dirty="0"/>
+              <a:rPr lang="en-US" i="0" dirty="0"/>
               <a:t>: to simulate the time it would take a real device to measure a temperature</a:t>
             </a:r>
           </a:p>
@@ -4098,31 +4107,35 @@
           <a:p>
             <a:pPr lvl="1"/>
             <a:r>
-              <a:rPr lang="en-US" dirty="0"/>
-              <a:t>Read interface, so that the </a:t>
-            </a:r>
-            <a:r>
-              <a:rPr lang="en-US" dirty="0" err="1"/>
+              <a:rPr lang="en-US" b="1" i="0" dirty="0"/>
+              <a:t>Read</a:t>
+            </a:r>
+            <a:r>
+              <a:rPr lang="en-US" i="0" dirty="0"/>
+              <a:t> interface, so that the </a:t>
+            </a:r>
+            <a:r>
+              <a:rPr lang="en-US" i="0" dirty="0" err="1"/>
               <a:t>TemperatureMonitor</a:t>
             </a:r>
             <a:r>
-              <a:rPr lang="en-US" dirty="0"/>
+              <a:rPr lang="en-US" i="0" dirty="0"/>
               <a:t> uses the </a:t>
             </a:r>
             <a:r>
-              <a:rPr lang="en-US" dirty="0" err="1"/>
+              <a:rPr lang="en-US" i="0" dirty="0" err="1"/>
               <a:t>TemperatureSensor</a:t>
             </a:r>
             <a:r>
-              <a:rPr lang="en-US" dirty="0"/>
+              <a:rPr lang="en-US" i="0" dirty="0"/>
               <a:t> by reading it: </a:t>
             </a:r>
             <a:r>
-              <a:rPr lang="en-US" dirty="0" err="1"/>
+              <a:rPr lang="en-US" i="0" dirty="0" err="1"/>
               <a:t>Temperature.read</a:t>
             </a:r>
             <a:r>
-              <a:rPr lang="en-US" dirty="0"/>
+              <a:rPr lang="en-US" i="0" dirty="0"/>
               <a:t>();</a:t>
             </a:r>
           </a:p>
@@ -4644,33 +4657,45 @@
           <a:p>
             <a:pPr lvl="1"/>
             <a:r>
-              <a:rPr lang="en-US" dirty="0"/>
-              <a:t>Threshold: to save latest threshold</a:t>
-            </a:r>
-          </a:p>
-          <a:p>
-            <a:pPr lvl="1"/>
-            <a:r>
-              <a:rPr lang="en-US" dirty="0"/>
-              <a:t>Temperature: in child nodes, to save latest read temperature</a:t>
-            </a:r>
-          </a:p>
-          <a:p>
-            <a:pPr lvl="1"/>
-            <a:r>
-              <a:rPr lang="en-US" dirty="0" err="1"/>
+              <a:rPr lang="en-US" b="1" i="0" dirty="0"/>
+              <a:t>Threshold</a:t>
+            </a:r>
+            <a:r>
+              <a:rPr lang="en-US" i="0" dirty="0"/>
+              <a:t>: to save latest threshold</a:t>
+            </a:r>
+          </a:p>
+          <a:p>
+            <a:pPr lvl="1"/>
+            <a:r>
+              <a:rPr lang="en-US" b="1" i="0" dirty="0"/>
+              <a:t>Temperature</a:t>
+            </a:r>
+            <a:r>
+              <a:rPr lang="en-US" i="0" dirty="0"/>
+              <a:t>: in child nodes, to save latest read temperature</a:t>
+            </a:r>
+          </a:p>
+          <a:p>
+            <a:pPr lvl="1"/>
+            <a:r>
+              <a:rPr lang="en-US" b="1" i="0" dirty="0" err="1"/>
               <a:t>maxTemp</a:t>
             </a:r>
             <a:r>
-              <a:rPr lang="en-US" dirty="0"/>
+              <a:rPr lang="en-US" i="0" dirty="0"/>
               <a:t>: in sink node, to keep track of the highest measured temperature for the final statistics made on the simulation</a:t>
             </a:r>
           </a:p>
           <a:p>
             <a:pPr lvl="1"/>
             <a:r>
-              <a:rPr lang="en-US" dirty="0"/>
-              <a:t>counter:</a:t>
+              <a:rPr lang="en-US" b="1" i="0" dirty="0"/>
+              <a:t>counter</a:t>
+            </a:r>
+            <a:r>
+              <a:rPr lang="en-US" i="0" dirty="0"/>
+              <a:t>:</a:t>
             </a:r>
           </a:p>
           <a:p>
@@ -4696,48 +4721,56 @@
           <a:p>
             <a:pPr lvl="1"/>
             <a:r>
-              <a:rPr lang="en-US" dirty="0" err="1"/>
+              <a:rPr lang="en-US" b="1" i="0" dirty="0" err="1"/>
               <a:t>dataCounter</a:t>
             </a:r>
             <a:r>
-              <a:rPr lang="en-US" dirty="0"/>
+              <a:rPr lang="en-US" i="0" dirty="0"/>
               <a:t>: on sink node, number of DATA messages received, for final statistics</a:t>
             </a:r>
           </a:p>
           <a:p>
             <a:pPr lvl="1"/>
             <a:r>
-              <a:rPr lang="en-US" dirty="0" err="1"/>
+              <a:rPr lang="en-US" b="1" i="0" dirty="0" err="1"/>
               <a:t>sentCounter</a:t>
             </a:r>
             <a:r>
-              <a:rPr lang="en-US" dirty="0"/>
-              <a:t>: total number of messages of any kind sent or forwarded by each node, for final statistics</a:t>
-            </a:r>
-          </a:p>
-          <a:p>
-            <a:pPr lvl="1"/>
-            <a:r>
-              <a:rPr lang="en-US" dirty="0"/>
-              <a:t>measurements: total number of temperature measurements made by child node</a:t>
-            </a:r>
-          </a:p>
-          <a:p>
-            <a:pPr lvl="1"/>
-            <a:r>
-              <a:rPr lang="en-US" dirty="0" err="1"/>
+              <a:rPr lang="en-US" b="1" i="0" dirty="0"/>
+              <a:t>: </a:t>
+            </a:r>
+            <a:r>
+              <a:rPr lang="en-US" i="0" dirty="0"/>
+              <a:t>total number of messages of any kind sent or forwarded by each node, for final statistics</a:t>
+            </a:r>
+          </a:p>
+          <a:p>
+            <a:pPr lvl="1"/>
+            <a:r>
+              <a:rPr lang="en-US" b="1" i="0" dirty="0"/>
+              <a:t>measurements</a:t>
+            </a:r>
+            <a:r>
+              <a:rPr lang="en-US" i="0" dirty="0"/>
+              <a:t>: total number of temperature measurements made by child node</a:t>
+            </a:r>
+          </a:p>
+          <a:p>
+            <a:pPr lvl="1"/>
+            <a:r>
+              <a:rPr lang="en-US" b="1" i="0" dirty="0" err="1"/>
               <a:t>prev_node</a:t>
             </a:r>
             <a:r>
-              <a:rPr lang="en-US" dirty="0"/>
+              <a:rPr lang="en-US" i="0" dirty="0"/>
               <a:t>: on child node, saves the address of the previous node on the route to get back to sink node. When sending or forwarding DATA </a:t>
             </a:r>
             <a:r>
-              <a:rPr lang="en-US" dirty="0" err="1"/>
+              <a:rPr lang="en-US" i="0" dirty="0" err="1"/>
               <a:t>msgs</a:t>
             </a:r>
             <a:r>
-              <a:rPr lang="en-US" dirty="0"/>
+              <a:rPr lang="en-US" i="0" dirty="0"/>
               <a:t>, each child node will send to the previous node</a:t>
             </a:r>
           </a:p>
@@ -4839,159 +4872,163 @@
           <a:lstStyle/>
           <a:p>
             <a:r>
-              <a:rPr lang="en-US" dirty="0"/>
+              <a:rPr lang="en-US" b="1" dirty="0"/>
               <a:t>event void </a:t>
             </a:r>
             <a:r>
-              <a:rPr lang="en-US" dirty="0" err="1"/>
+              <a:rPr lang="en-US" b="1" dirty="0" err="1"/>
               <a:t>Boot.booted</a:t>
             </a:r>
             <a:r>
-              <a:rPr lang="en-US" dirty="0"/>
-              <a:t>(): when a sensor is booted</a:t>
-            </a:r>
-          </a:p>
-          <a:p>
-            <a:pPr lvl="1"/>
-            <a:r>
-              <a:rPr lang="en-US" dirty="0"/>
+              <a:rPr lang="en-US" b="1" dirty="0"/>
+              <a:t>(): </a:t>
+            </a:r>
+            <a:r>
+              <a:rPr lang="en-US" dirty="0"/>
+              <a:t>when a sensor is booted</a:t>
+            </a:r>
+          </a:p>
+          <a:p>
+            <a:pPr lvl="1"/>
+            <a:r>
+              <a:rPr lang="en-US" i="0" dirty="0"/>
               <a:t>Variables are initialized</a:t>
             </a:r>
           </a:p>
           <a:p>
             <a:pPr lvl="1"/>
             <a:r>
-              <a:rPr lang="en-US" dirty="0"/>
+              <a:rPr lang="en-US" i="0" dirty="0"/>
               <a:t>Debug message written on “nodes” log</a:t>
             </a:r>
           </a:p>
           <a:p>
             <a:pPr lvl="1"/>
             <a:r>
-              <a:rPr lang="en-US" dirty="0" err="1"/>
+              <a:rPr lang="en-US" i="0" dirty="0" err="1"/>
               <a:t>AMControl</a:t>
             </a:r>
             <a:r>
-              <a:rPr lang="en-US" dirty="0"/>
+              <a:rPr lang="en-US" i="0" dirty="0"/>
               <a:t> started</a:t>
             </a:r>
           </a:p>
           <a:p>
             <a:r>
-              <a:rPr lang="en-US" dirty="0"/>
+              <a:rPr lang="en-US" b="1" dirty="0"/>
               <a:t>event void </a:t>
             </a:r>
             <a:r>
-              <a:rPr lang="en-US" dirty="0" err="1"/>
+              <a:rPr lang="en-US" b="1" dirty="0" err="1"/>
               <a:t>AMControl.startDone</a:t>
             </a:r>
             <a:r>
-              <a:rPr lang="en-US" dirty="0"/>
+              <a:rPr lang="en-US" b="1" dirty="0"/>
               <a:t>(</a:t>
             </a:r>
             <a:r>
-              <a:rPr lang="en-US" dirty="0" err="1"/>
+              <a:rPr lang="en-US" b="1" dirty="0" err="1"/>
               <a:t>error_t</a:t>
             </a:r>
             <a:r>
-              <a:rPr lang="en-US" dirty="0"/>
-              <a:t> err): when the AM Layer is opened and started</a:t>
-            </a:r>
-          </a:p>
-          <a:p>
-            <a:pPr lvl="1"/>
-            <a:r>
-              <a:rPr lang="en-US" dirty="0"/>
+              <a:rPr lang="en-US" b="1" dirty="0"/>
+              <a:t> err): </a:t>
+            </a:r>
+            <a:r>
+              <a:rPr lang="en-US" dirty="0"/>
+              <a:t>when the AM Layer is opened and started</a:t>
+            </a:r>
+          </a:p>
+          <a:p>
+            <a:pPr lvl="1"/>
+            <a:r>
+              <a:rPr lang="en-US" i="0" dirty="0"/>
               <a:t>Debug message written on “nodes” log</a:t>
             </a:r>
           </a:p>
           <a:p>
             <a:pPr lvl="1"/>
             <a:r>
-              <a:rPr lang="en-US" dirty="0"/>
+              <a:rPr lang="en-US" i="0" dirty="0"/>
               <a:t>In the sink node, the </a:t>
             </a:r>
             <a:r>
-              <a:rPr lang="en-US" dirty="0" err="1"/>
+              <a:rPr lang="en-US" i="0" dirty="0" err="1"/>
               <a:t>TimerSink</a:t>
             </a:r>
             <a:r>
-              <a:rPr lang="en-US" dirty="0"/>
+              <a:rPr lang="en-US" i="0" dirty="0"/>
               <a:t> is started with its period</a:t>
             </a:r>
           </a:p>
           <a:p>
             <a:pPr lvl="1"/>
             <a:r>
-              <a:rPr lang="en-US" dirty="0"/>
+              <a:rPr lang="en-US" i="0" dirty="0"/>
               <a:t>In child node, the </a:t>
             </a:r>
             <a:r>
-              <a:rPr lang="en-US" dirty="0" err="1"/>
+              <a:rPr lang="en-US" i="0" dirty="0" err="1"/>
               <a:t>TimerSensor</a:t>
             </a:r>
             <a:r>
-              <a:rPr lang="en-US" dirty="0"/>
+              <a:rPr lang="en-US" i="0" dirty="0"/>
               <a:t> is started with its period</a:t>
             </a:r>
           </a:p>
           <a:p>
             <a:pPr lvl="1"/>
             <a:r>
-              <a:rPr lang="en-US" dirty="0"/>
+              <a:rPr lang="en-US" i="0" dirty="0"/>
               <a:t>In case of error, </a:t>
             </a:r>
             <a:r>
-              <a:rPr lang="en-US" dirty="0" err="1"/>
+              <a:rPr lang="en-US" i="0" dirty="0" err="1"/>
               <a:t>AMControl</a:t>
             </a:r>
             <a:r>
-              <a:rPr lang="en-US" dirty="0"/>
+              <a:rPr lang="en-US" i="0" dirty="0"/>
               <a:t> is started again</a:t>
             </a:r>
           </a:p>
           <a:p>
             <a:r>
-              <a:rPr lang="en-US" dirty="0"/>
+              <a:rPr lang="en-US" b="1" dirty="0"/>
               <a:t>event void </a:t>
             </a:r>
             <a:r>
-              <a:rPr lang="en-US" dirty="0" err="1"/>
+              <a:rPr lang="en-US" b="1" dirty="0" err="1"/>
               <a:t>AMControl.stopDone</a:t>
             </a:r>
             <a:r>
-              <a:rPr lang="en-US" dirty="0"/>
+              <a:rPr lang="en-US" b="1" dirty="0"/>
               <a:t>(</a:t>
             </a:r>
             <a:r>
-              <a:rPr lang="en-US" dirty="0" err="1"/>
+              <a:rPr lang="en-US" b="1" dirty="0" err="1"/>
               <a:t>error_t</a:t>
             </a:r>
             <a:r>
-              <a:rPr lang="en-US" dirty="0"/>
-              <a:t> err): after stopping the AM Layer</a:t>
-            </a:r>
-          </a:p>
-          <a:p>
-            <a:pPr lvl="1"/>
-            <a:r>
-              <a:rPr lang="en-US" dirty="0"/>
+              <a:rPr lang="en-US" b="1" dirty="0"/>
+              <a:t> err): </a:t>
+            </a:r>
+            <a:r>
+              <a:rPr lang="en-US" dirty="0"/>
+              <a:t>after stopping the AM Layer</a:t>
+            </a:r>
+          </a:p>
+          <a:p>
+            <a:pPr lvl="1"/>
+            <a:r>
+              <a:rPr lang="en-US" i="0" dirty="0"/>
               <a:t>Debug message written on “nodes” log</a:t>
             </a:r>
           </a:p>
           <a:p>
             <a:pPr lvl="1"/>
             <a:r>
-              <a:rPr lang="en-US" dirty="0"/>
-              <a:t>Timers are </a:t>
-            </a:r>
-            <a:r>
-              <a:rPr lang="en-US" dirty="0" err="1"/>
-              <a:t>stoped</a:t>
-            </a:r>
-            <a:r>
-              <a:rPr lang="en-US" dirty="0"/>
-              <a:t> in each case</a:t>
+              <a:rPr lang="en-US" i="0" dirty="0"/>
+              <a:t>Timers are stopped in each case</a:t>
             </a:r>
           </a:p>
           <a:p>
@@ -5094,52 +5131,60 @@
           <a:lstStyle/>
           <a:p>
             <a:r>
-              <a:rPr lang="en-US" dirty="0" err="1"/>
+              <a:rPr lang="en-US" b="1" dirty="0" err="1"/>
               <a:t>TimerSink.fired</a:t>
             </a:r>
             <a:r>
-              <a:rPr lang="en-US" dirty="0"/>
-              <a:t>(): time to calculate new threshold</a:t>
-            </a:r>
-          </a:p>
-          <a:p>
-            <a:pPr lvl="1"/>
-            <a:r>
-              <a:rPr lang="en-US" dirty="0"/>
+              <a:rPr lang="en-US" b="1" dirty="0"/>
+              <a:t>(): </a:t>
+            </a:r>
+            <a:r>
+              <a:rPr lang="en-US" dirty="0"/>
+              <a:t>time to calculate new threshold</a:t>
+            </a:r>
+          </a:p>
+          <a:p>
+            <a:pPr lvl="1"/>
+            <a:r>
+              <a:rPr lang="en-US" i="0" dirty="0"/>
               <a:t>New threshold is calculated with the interface provided by </a:t>
             </a:r>
             <a:r>
-              <a:rPr lang="en-US" dirty="0" err="1"/>
+              <a:rPr lang="en-US" i="0" dirty="0" err="1"/>
               <a:t>RandomC</a:t>
             </a:r>
             <a:r>
-              <a:rPr lang="en-US" dirty="0"/>
+              <a:rPr lang="en-US" i="0" dirty="0"/>
               <a:t> </a:t>
             </a:r>
           </a:p>
           <a:p>
             <a:pPr lvl="1"/>
             <a:r>
-              <a:rPr lang="en-US" dirty="0" err="1"/>
+              <a:rPr lang="en-US" i="0" dirty="0" err="1"/>
               <a:t>sendSETUP</a:t>
             </a:r>
             <a:r>
-              <a:rPr lang="en-US" dirty="0"/>
+              <a:rPr lang="en-US" i="0" dirty="0"/>
               <a:t>() task is posted</a:t>
             </a:r>
           </a:p>
           <a:p>
             <a:r>
-              <a:rPr lang="en-US" dirty="0"/>
+              <a:rPr lang="en-US" b="1" dirty="0"/>
               <a:t>task void </a:t>
             </a:r>
             <a:r>
-              <a:rPr lang="en-US" dirty="0" err="1"/>
+              <a:rPr lang="en-US" b="1" dirty="0" err="1"/>
               <a:t>sendSETUP</a:t>
             </a:r>
             <a:r>
-              <a:rPr lang="en-US" dirty="0"/>
-              <a:t>(): to send a new SETUP msg </a:t>
+              <a:rPr lang="en-US" b="1" dirty="0"/>
+              <a:t>(): </a:t>
+            </a:r>
+            <a:r>
+              <a:rPr lang="en-US" dirty="0"/>
+              <a:t>to send a new SETUP msg </a:t>
             </a:r>
             <a:r>
               <a:rPr lang="en-US" b="1" dirty="0"/>
@@ -5149,60 +5194,64 @@
           <a:p>
             <a:pPr lvl="1"/>
             <a:r>
-              <a:rPr lang="en-US" dirty="0"/>
+              <a:rPr lang="en-US" i="0" dirty="0"/>
               <a:t>Check if it is the sink node, and if it is not busy</a:t>
             </a:r>
           </a:p>
           <a:p>
             <a:pPr lvl="1"/>
             <a:r>
-              <a:rPr lang="en-US" dirty="0"/>
+              <a:rPr lang="en-US" i="0" dirty="0"/>
               <a:t>Create new setup message carrying the ID given by the counter variable and the new threshold.</a:t>
             </a:r>
           </a:p>
           <a:p>
             <a:pPr lvl="1"/>
             <a:r>
-              <a:rPr lang="en-US" dirty="0"/>
+              <a:rPr lang="en-US" i="0" dirty="0"/>
               <a:t>Send through </a:t>
             </a:r>
             <a:r>
-              <a:rPr lang="en-US" dirty="0" err="1"/>
+              <a:rPr lang="en-US" i="0" dirty="0" err="1"/>
               <a:t>AMLayer</a:t>
             </a:r>
             <a:r>
-              <a:rPr lang="en-US" dirty="0"/>
+              <a:rPr lang="en-US" i="0" dirty="0"/>
               <a:t> with </a:t>
             </a:r>
             <a:r>
-              <a:rPr lang="en-US" dirty="0" err="1"/>
+              <a:rPr lang="en-US" i="0" dirty="0" err="1"/>
               <a:t>AMSend</a:t>
             </a:r>
             <a:r>
-              <a:rPr lang="en-US" dirty="0"/>
+              <a:rPr lang="en-US" i="0" dirty="0"/>
               <a:t> on Broadcast address</a:t>
             </a:r>
           </a:p>
           <a:p>
             <a:r>
-              <a:rPr lang="en-US" dirty="0"/>
+              <a:rPr lang="en-US" b="1" dirty="0"/>
               <a:t>event </a:t>
             </a:r>
             <a:r>
-              <a:rPr lang="en-US" dirty="0" err="1"/>
+              <a:rPr lang="en-US" b="1" dirty="0" err="1"/>
               <a:t>message_t</a:t>
             </a:r>
             <a:r>
-              <a:rPr lang="en-US" dirty="0"/>
+              <a:rPr lang="en-US" b="1" dirty="0"/>
               <a:t> * </a:t>
             </a:r>
             <a:r>
-              <a:rPr lang="en-US" dirty="0" err="1"/>
+              <a:rPr lang="en-US" b="1" dirty="0" err="1"/>
               <a:t>Receive.receive</a:t>
             </a:r>
             <a:r>
-              <a:rPr lang="en-US" dirty="0"/>
-              <a:t>(): when </a:t>
+              <a:rPr lang="en-US" b="1" dirty="0"/>
+              <a:t>(): </a:t>
+            </a:r>
+            <a:r>
+              <a:rPr lang="en-US" dirty="0"/>
+              <a:t>when </a:t>
             </a:r>
             <a:r>
               <a:rPr lang="en-US" b="1" dirty="0"/>
@@ -5216,47 +5265,47 @@
           <a:p>
             <a:pPr lvl="1"/>
             <a:r>
-              <a:rPr lang="en-US" dirty="0"/>
+              <a:rPr lang="en-US" i="0" dirty="0"/>
               <a:t>Check it is child node and the message is SETUP msg</a:t>
             </a:r>
           </a:p>
           <a:p>
             <a:pPr lvl="1"/>
             <a:r>
-              <a:rPr lang="en-US" dirty="0"/>
+              <a:rPr lang="en-US" i="0" dirty="0"/>
               <a:t>Check it is not an old SETUP message by comparing its ID with the counter</a:t>
             </a:r>
           </a:p>
           <a:p>
             <a:pPr lvl="1"/>
             <a:r>
-              <a:rPr lang="en-US" dirty="0"/>
+              <a:rPr lang="en-US" i="0" dirty="0"/>
               <a:t>Save the msg</a:t>
             </a:r>
           </a:p>
           <a:p>
             <a:pPr lvl="1"/>
             <a:r>
-              <a:rPr lang="en-US" b="1" dirty="0"/>
+              <a:rPr lang="en-US" b="1" i="0" dirty="0"/>
               <a:t>Save the address of the sender as the </a:t>
             </a:r>
             <a:r>
-              <a:rPr lang="en-US" b="1" dirty="0" err="1"/>
+              <a:rPr lang="en-US" b="1" i="0" dirty="0" err="1"/>
               <a:t>prev_node</a:t>
             </a:r>
-            <a:endParaRPr lang="en-US" b="1" dirty="0"/>
-          </a:p>
-          <a:p>
-            <a:pPr lvl="1"/>
-            <a:r>
-              <a:rPr lang="en-US" dirty="0"/>
+            <a:endParaRPr lang="en-US" b="1" i="0" dirty="0"/>
+          </a:p>
+          <a:p>
+            <a:pPr lvl="1"/>
+            <a:r>
+              <a:rPr lang="en-US" i="0" dirty="0"/>
               <a:t>Start on shot of 80+TOS_NODE_ID*15  units of time of the </a:t>
             </a:r>
             <a:r>
-              <a:rPr lang="en-US" dirty="0" err="1"/>
+              <a:rPr lang="en-US" i="0" dirty="0" err="1"/>
               <a:t>WaitingTimer</a:t>
             </a:r>
-            <a:endParaRPr lang="en-US" dirty="0"/>
+            <a:endParaRPr lang="en-US" i="0" dirty="0"/>
           </a:p>
         </p:txBody>
       </p:sp>
@@ -5354,37 +5403,45 @@
           <a:lstStyle/>
           <a:p>
             <a:r>
-              <a:rPr lang="en-US" dirty="0" err="1"/>
+              <a:rPr lang="en-US" b="1" dirty="0" err="1"/>
               <a:t>WaitingTimer.fired</a:t>
             </a:r>
             <a:r>
-              <a:rPr lang="en-US" dirty="0"/>
-              <a:t>(): time to calculate new threshold</a:t>
-            </a:r>
-          </a:p>
-          <a:p>
-            <a:pPr lvl="1"/>
-            <a:r>
-              <a:rPr lang="en-US" dirty="0" err="1"/>
+              <a:rPr lang="en-US" b="1" dirty="0"/>
+              <a:t>(): </a:t>
+            </a:r>
+            <a:r>
+              <a:rPr lang="en-US" dirty="0"/>
+              <a:t>time to calculate new threshold</a:t>
+            </a:r>
+          </a:p>
+          <a:p>
+            <a:pPr lvl="1"/>
+            <a:r>
+              <a:rPr lang="en-US" i="0" dirty="0" err="1"/>
               <a:t>forwardSETUP</a:t>
             </a:r>
             <a:r>
-              <a:rPr lang="en-US" dirty="0"/>
+              <a:rPr lang="en-US" i="0" dirty="0"/>
               <a:t>() task is posted</a:t>
             </a:r>
           </a:p>
           <a:p>
             <a:r>
-              <a:rPr lang="en-US" dirty="0"/>
+              <a:rPr lang="en-US" b="1" dirty="0"/>
               <a:t>task void </a:t>
             </a:r>
             <a:r>
-              <a:rPr lang="en-US" dirty="0" err="1"/>
+              <a:rPr lang="en-US" b="1" dirty="0" err="1"/>
               <a:t>forwardSETUP</a:t>
             </a:r>
             <a:r>
-              <a:rPr lang="en-US" dirty="0"/>
-              <a:t>(): to forward in broadcast the last received SETUP msg </a:t>
+              <a:rPr lang="en-US" b="1" dirty="0"/>
+              <a:t>(): </a:t>
+            </a:r>
+            <a:r>
+              <a:rPr lang="en-US" dirty="0"/>
+              <a:t>to forward in broadcast the last received SETUP msg </a:t>
             </a:r>
             <a:r>
               <a:rPr lang="en-US" b="1" dirty="0"/>
@@ -5394,37 +5451,37 @@
           <a:p>
             <a:pPr lvl="1"/>
             <a:r>
-              <a:rPr lang="en-US" dirty="0"/>
+              <a:rPr lang="en-US" i="0" dirty="0"/>
               <a:t>Check if it is not busy</a:t>
             </a:r>
           </a:p>
           <a:p>
             <a:pPr lvl="1"/>
             <a:r>
-              <a:rPr lang="en-US" dirty="0"/>
+              <a:rPr lang="en-US" i="0" dirty="0"/>
               <a:t>Create setup message with the corresponding data</a:t>
             </a:r>
           </a:p>
           <a:p>
             <a:pPr lvl="1"/>
             <a:r>
-              <a:rPr lang="en-US" dirty="0"/>
+              <a:rPr lang="en-US" i="0" dirty="0"/>
               <a:t>Send through </a:t>
             </a:r>
             <a:r>
-              <a:rPr lang="en-US" dirty="0" err="1"/>
+              <a:rPr lang="en-US" i="0" dirty="0" err="1"/>
               <a:t>AMLayer</a:t>
             </a:r>
             <a:r>
-              <a:rPr lang="en-US" dirty="0"/>
+              <a:rPr lang="en-US" i="0" dirty="0"/>
               <a:t> with </a:t>
             </a:r>
             <a:r>
-              <a:rPr lang="en-US" dirty="0" err="1"/>
+              <a:rPr lang="en-US" i="0" dirty="0" err="1"/>
               <a:t>AMSend</a:t>
             </a:r>
             <a:r>
-              <a:rPr lang="en-US" dirty="0"/>
+              <a:rPr lang="en-US" i="0" dirty="0"/>
               <a:t> on Broadcast address</a:t>
             </a:r>
           </a:p>
@@ -5524,19 +5581,61 @@
           <a:lstStyle/>
           <a:p>
             <a:r>
-              <a:rPr lang="en-US" dirty="0" err="1"/>
+              <a:rPr lang="en-US" b="1" dirty="0" err="1"/>
               <a:t>SensorTimer.fired</a:t>
             </a:r>
             <a:r>
-              <a:rPr lang="en-US" dirty="0"/>
-              <a:t>(): time to measure new temperature</a:t>
-            </a:r>
-          </a:p>
-          <a:p>
-            <a:pPr lvl="1"/>
-            <a:r>
-              <a:rPr lang="en-US" dirty="0"/>
+              <a:rPr lang="en-US" b="1" dirty="0"/>
+              <a:t>(): </a:t>
+            </a:r>
+            <a:r>
+              <a:rPr lang="en-US" dirty="0"/>
+              <a:t>time to measure new temperature</a:t>
+            </a:r>
+          </a:p>
+          <a:p>
+            <a:pPr lvl="1"/>
+            <a:r>
+              <a:rPr lang="en-US" i="0" dirty="0"/>
               <a:t>Call read on the </a:t>
+            </a:r>
+            <a:r>
+              <a:rPr lang="en-US" i="0" dirty="0" err="1"/>
+              <a:t>TemperatureSensor</a:t>
+            </a:r>
+            <a:r>
+              <a:rPr lang="en-US" i="0" dirty="0"/>
+              <a:t> component</a:t>
+            </a:r>
+          </a:p>
+          <a:p>
+            <a:r>
+              <a:rPr lang="en-US" b="1" dirty="0"/>
+              <a:t>event void </a:t>
+            </a:r>
+            <a:r>
+              <a:rPr lang="en-US" b="1" dirty="0" err="1"/>
+              <a:t>Temperature.readDone</a:t>
+            </a:r>
+            <a:r>
+              <a:rPr lang="en-US" b="1" dirty="0"/>
+              <a:t>(</a:t>
+            </a:r>
+            <a:r>
+              <a:rPr lang="en-US" b="1" dirty="0" err="1"/>
+              <a:t>error_t</a:t>
+            </a:r>
+            <a:r>
+              <a:rPr lang="en-US" b="1" dirty="0"/>
+              <a:t> err, uint16_t </a:t>
+            </a:r>
+            <a:r>
+              <a:rPr lang="en-US" b="1" dirty="0" err="1"/>
+              <a:t>val</a:t>
+            </a:r>
+            <a:r>
+              <a:rPr lang="en-US" b="1" dirty="0"/>
+              <a:t>): </a:t>
             </a:r>
             <a:r>
               <a:rPr lang="en-US" dirty="0" err="1"/>
@@ -5544,102 +5643,64 @@
             </a:r>
             <a:r>
               <a:rPr lang="en-US" dirty="0"/>
-              <a:t> component</a:t>
-            </a:r>
-          </a:p>
-          <a:p>
-            <a:r>
-              <a:rPr lang="en-US" dirty="0"/>
-              <a:t>event void </a:t>
-            </a:r>
-            <a:r>
-              <a:rPr lang="en-US" dirty="0" err="1"/>
-              <a:t>Temperature.readDone</a:t>
-            </a:r>
-            <a:r>
-              <a:rPr lang="en-US" dirty="0"/>
-              <a:t>(</a:t>
-            </a:r>
-            <a:r>
-              <a:rPr lang="en-US" dirty="0" err="1"/>
-              <a:t>error_t</a:t>
-            </a:r>
-            <a:r>
-              <a:rPr lang="en-US" dirty="0"/>
-              <a:t> err, uint16_t </a:t>
+              <a:t> returns a read temperature </a:t>
             </a:r>
             <a:r>
               <a:rPr lang="en-US" dirty="0" err="1"/>
               <a:t>val</a:t>
             </a:r>
-            <a:r>
-              <a:rPr lang="en-US" dirty="0"/>
-              <a:t>): </a:t>
-            </a:r>
-            <a:r>
-              <a:rPr lang="en-US" dirty="0" err="1"/>
-              <a:t>TemperatureSensor</a:t>
-            </a:r>
-            <a:r>
-              <a:rPr lang="en-US" dirty="0"/>
-              <a:t> returns a read temperature </a:t>
-            </a:r>
-            <a:r>
-              <a:rPr lang="en-US" i="1" dirty="0" err="1"/>
+            <a:endParaRPr lang="en-US" dirty="0"/>
+          </a:p>
+          <a:p>
+            <a:pPr lvl="1"/>
+            <a:r>
+              <a:rPr lang="en-US" i="0" dirty="0"/>
+              <a:t>New temperature with value </a:t>
+            </a:r>
+            <a:r>
+              <a:rPr lang="en-US" i="0" dirty="0" err="1"/>
               <a:t>val</a:t>
             </a:r>
-            <a:endParaRPr lang="en-US" i="1" dirty="0"/>
-          </a:p>
-          <a:p>
-            <a:pPr lvl="1"/>
-            <a:r>
-              <a:rPr lang="en-US" dirty="0"/>
-              <a:t>New temperature with value </a:t>
-            </a:r>
-            <a:r>
-              <a:rPr lang="en-US" dirty="0" err="1"/>
-              <a:t>val</a:t>
-            </a:r>
-            <a:r>
-              <a:rPr lang="en-US" dirty="0"/>
+            <a:r>
+              <a:rPr lang="en-US" i="0" dirty="0"/>
               <a:t> saved on node</a:t>
             </a:r>
           </a:p>
           <a:p>
             <a:pPr lvl="1"/>
             <a:r>
-              <a:rPr lang="en-US" dirty="0"/>
+              <a:rPr lang="en-US" i="0" dirty="0"/>
               <a:t>Increment number of measurements</a:t>
             </a:r>
           </a:p>
           <a:p>
             <a:pPr lvl="1"/>
             <a:r>
-              <a:rPr lang="en-US" i="1" dirty="0"/>
-              <a:t>If temperature is a</a:t>
-            </a:r>
-            <a:r>
-              <a:rPr lang="en-US" dirty="0"/>
-              <a:t>bove threshold, post task </a:t>
-            </a:r>
-            <a:r>
-              <a:rPr lang="en-US" dirty="0" err="1"/>
+              <a:rPr lang="en-US" i="0" dirty="0"/>
+              <a:t>If temperature is above threshold, post task </a:t>
+            </a:r>
+            <a:r>
+              <a:rPr lang="en-US" i="0" dirty="0" err="1"/>
               <a:t>sendData</a:t>
             </a:r>
-            <a:endParaRPr lang="en-US" dirty="0"/>
-          </a:p>
-          <a:p>
-            <a:r>
-              <a:rPr lang="en-US" dirty="0"/>
+            <a:endParaRPr lang="en-US" i="0" dirty="0"/>
+          </a:p>
+          <a:p>
+            <a:r>
+              <a:rPr lang="en-US" b="1" dirty="0"/>
               <a:t>task void </a:t>
             </a:r>
             <a:r>
-              <a:rPr lang="en-US" dirty="0" err="1"/>
+              <a:rPr lang="en-US" b="1" dirty="0" err="1"/>
               <a:t>sendDATA</a:t>
             </a:r>
             <a:r>
-              <a:rPr lang="en-US" dirty="0"/>
-              <a:t>(): performed </a:t>
+              <a:rPr lang="en-US" b="1" dirty="0"/>
+              <a:t>(): </a:t>
+            </a:r>
+            <a:r>
+              <a:rPr lang="en-US" dirty="0"/>
+              <a:t>performed </a:t>
             </a:r>
             <a:r>
               <a:rPr lang="en-US" b="1" dirty="0"/>
@@ -5649,45 +5710,45 @@
           <a:p>
             <a:pPr lvl="1"/>
             <a:r>
-              <a:rPr lang="en-US" dirty="0"/>
+              <a:rPr lang="en-US" i="0" dirty="0"/>
               <a:t>Check it is not the sink node and it is not busy</a:t>
             </a:r>
           </a:p>
           <a:p>
             <a:pPr lvl="1"/>
             <a:r>
-              <a:rPr lang="en-US" dirty="0"/>
+              <a:rPr lang="en-US" i="0" dirty="0"/>
               <a:t>Create new data message with the counter as </a:t>
             </a:r>
             <a:r>
-              <a:rPr lang="en-US" dirty="0" err="1"/>
+              <a:rPr lang="en-US" i="0" dirty="0" err="1"/>
               <a:t>msg_id</a:t>
             </a:r>
             <a:r>
-              <a:rPr lang="en-US" dirty="0"/>
+              <a:rPr lang="en-US" i="0" dirty="0"/>
               <a:t>, their own TOS_NOD_ID as </a:t>
             </a:r>
             <a:r>
-              <a:rPr lang="en-US" dirty="0" err="1"/>
+              <a:rPr lang="en-US" i="0" dirty="0" err="1"/>
               <a:t>node_id</a:t>
             </a:r>
             <a:r>
-              <a:rPr lang="en-US" dirty="0"/>
+              <a:rPr lang="en-US" i="0" dirty="0"/>
               <a:t>, and the temperature</a:t>
             </a:r>
           </a:p>
           <a:p>
             <a:pPr lvl="1"/>
             <a:r>
-              <a:rPr lang="en-US" dirty="0"/>
+              <a:rPr lang="en-US" i="0" dirty="0"/>
               <a:t>Send with </a:t>
             </a:r>
             <a:r>
-              <a:rPr lang="en-US" dirty="0" err="1"/>
+              <a:rPr lang="en-US" i="0" dirty="0" err="1"/>
               <a:t>AMSend</a:t>
             </a:r>
             <a:r>
-              <a:rPr lang="en-US" dirty="0"/>
+              <a:rPr lang="en-US" i="0" dirty="0"/>
               <a:t> to the address of the previous node on the route</a:t>
             </a:r>
           </a:p>
@@ -5787,30 +5848,34 @@
           <a:lstStyle/>
           <a:p>
             <a:r>
-              <a:rPr lang="en-US" dirty="0"/>
+              <a:rPr lang="en-US" b="1" dirty="0"/>
               <a:t>event </a:t>
             </a:r>
             <a:r>
-              <a:rPr lang="en-US" dirty="0" err="1"/>
+              <a:rPr lang="en-US" b="1" dirty="0" err="1"/>
               <a:t>message_t</a:t>
             </a:r>
             <a:r>
-              <a:rPr lang="en-US" dirty="0"/>
+              <a:rPr lang="en-US" b="1" dirty="0"/>
               <a:t> * </a:t>
             </a:r>
             <a:r>
-              <a:rPr lang="en-US" dirty="0" err="1"/>
+              <a:rPr lang="en-US" b="1" dirty="0" err="1"/>
               <a:t>Receive.receive</a:t>
             </a:r>
             <a:r>
-              <a:rPr lang="en-US" dirty="0"/>
-              <a:t>(): receiving DATA msg, 2 cases depending if the receiving node is the Sink node or another child</a:t>
-            </a:r>
-          </a:p>
-          <a:p>
-            <a:pPr lvl="1"/>
-            <a:r>
-              <a:rPr lang="en-US" dirty="0"/>
+              <a:rPr lang="en-US" b="1" dirty="0"/>
+              <a:t>(): </a:t>
+            </a:r>
+            <a:r>
+              <a:rPr lang="en-US" dirty="0"/>
+              <a:t>receiving DATA msg, 2 cases depending if the receiving node is the Sink node or another child</a:t>
+            </a:r>
+          </a:p>
+          <a:p>
+            <a:pPr lvl="1"/>
+            <a:r>
+              <a:rPr lang="en-US" i="0" dirty="0"/>
               <a:t>Sink node: DATA msg has arrived to its destination</a:t>
             </a:r>
           </a:p>
@@ -5847,7 +5912,7 @@
           <a:p>
             <a:pPr lvl="1"/>
             <a:r>
-              <a:rPr lang="en-US" dirty="0"/>
+              <a:rPr lang="en-US" i="0" dirty="0"/>
               <a:t>Child node: must forward data</a:t>
             </a:r>
           </a:p>
@@ -5871,16 +5936,20 @@
           </a:p>
           <a:p>
             <a:r>
-              <a:rPr lang="en-US" dirty="0"/>
+              <a:rPr lang="en-US" b="1" dirty="0"/>
               <a:t>task void </a:t>
             </a:r>
             <a:r>
-              <a:rPr lang="en-US" dirty="0" err="1"/>
+              <a:rPr lang="en-US" b="1" dirty="0" err="1"/>
               <a:t>forwardDATA</a:t>
             </a:r>
             <a:r>
-              <a:rPr lang="en-US" dirty="0"/>
-              <a:t>(): performed </a:t>
+              <a:rPr lang="en-US" b="1" dirty="0"/>
+              <a:t>(): </a:t>
+            </a:r>
+            <a:r>
+              <a:rPr lang="en-US" dirty="0"/>
+              <a:t>performed </a:t>
             </a:r>
             <a:r>
               <a:rPr lang="en-US" b="1" dirty="0"/>
@@ -5890,29 +5959,29 @@
           <a:p>
             <a:pPr lvl="1"/>
             <a:r>
-              <a:rPr lang="en-US" dirty="0"/>
+              <a:rPr lang="en-US" i="0" dirty="0"/>
               <a:t>Check it is not the sink node and it is not busy</a:t>
             </a:r>
           </a:p>
           <a:p>
             <a:pPr lvl="1"/>
             <a:r>
-              <a:rPr lang="en-US" dirty="0"/>
+              <a:rPr lang="en-US" i="0" dirty="0"/>
               <a:t>Create new data message with the corresponding values</a:t>
             </a:r>
           </a:p>
           <a:p>
             <a:pPr lvl="1"/>
             <a:r>
-              <a:rPr lang="en-US" dirty="0"/>
+              <a:rPr lang="en-US" i="0" dirty="0"/>
               <a:t>Send with </a:t>
             </a:r>
             <a:r>
-              <a:rPr lang="en-US" dirty="0" err="1"/>
+              <a:rPr lang="en-US" i="0" dirty="0" err="1"/>
               <a:t>AMSend</a:t>
             </a:r>
             <a:r>
-              <a:rPr lang="en-US" dirty="0"/>
+              <a:rPr lang="en-US" i="0" dirty="0"/>
               <a:t> to the address of the previous node on the route</a:t>
             </a:r>
           </a:p>
@@ -6011,7 +6080,7 @@
           <a:p>
             <a:r>
               <a:rPr lang="en-US" dirty="0"/>
-              <a:t>There are some scenarios that have been discarded because they were not specifically asked to be considered, but that could actually happen and could be handled differently.</a:t>
+              <a:t>There are some scenarios that have been discarded because they were not specifically asked to be considered, but that could happen and could be handled differently.</a:t>
             </a:r>
           </a:p>
           <a:p>
@@ -6023,22 +6092,22 @@
           <a:p>
             <a:pPr lvl="1"/>
             <a:r>
-              <a:rPr lang="en-US" dirty="0"/>
+              <a:rPr lang="en-US" i="0" dirty="0"/>
               <a:t>When sink node receives a DATA msg, it does not know if that data was measured with respect to the last threshold or any other. In our functionality it did not really matter because we are not really doing anything with the temperatures received by the sink node, except keeping track of the maximum recorded temperature. </a:t>
             </a:r>
           </a:p>
           <a:p>
             <a:pPr lvl="1"/>
             <a:r>
-              <a:rPr lang="en-US" dirty="0"/>
+              <a:rPr lang="en-US" i="0" dirty="0"/>
               <a:t>If we had wanted to have this information, we could have added another field in the </a:t>
             </a:r>
             <a:r>
-              <a:rPr lang="en-US" dirty="0" err="1"/>
+              <a:rPr lang="en-US" i="0" dirty="0" err="1"/>
               <a:t>data_msg_t</a:t>
             </a:r>
             <a:r>
-              <a:rPr lang="en-US" dirty="0"/>
+              <a:rPr lang="en-US" i="0" dirty="0"/>
               <a:t> to hold the threshold associated with that temperature</a:t>
             </a:r>
           </a:p>
@@ -6051,29 +6120,29 @@
           <a:p>
             <a:pPr lvl="1"/>
             <a:r>
-              <a:rPr lang="en-US" dirty="0"/>
+              <a:rPr lang="en-US" i="0" dirty="0"/>
               <a:t>The virtual time of the Virtual Machine is not the same as the computers time.</a:t>
             </a:r>
           </a:p>
           <a:p>
             <a:pPr lvl="1"/>
             <a:r>
-              <a:rPr lang="en-US" dirty="0"/>
+              <a:rPr lang="en-US" i="0" dirty="0"/>
               <a:t>Using the functions </a:t>
             </a:r>
             <a:r>
-              <a:rPr lang="en-US" dirty="0" err="1"/>
+              <a:rPr lang="en-US" i="0" dirty="0" err="1"/>
               <a:t>ticksPerSecond</a:t>
             </a:r>
             <a:r>
-              <a:rPr lang="en-US" dirty="0"/>
+              <a:rPr lang="en-US" i="0" dirty="0"/>
               <a:t>() and time() and the conversion formulas shown in class by the teachers, we are not able to print the info each 10 seconds. The information prints much faster and time passes much faster.</a:t>
             </a:r>
           </a:p>
           <a:p>
             <a:pPr lvl="1"/>
             <a:r>
-              <a:rPr lang="en-US" dirty="0"/>
+              <a:rPr lang="en-US" i="0" dirty="0"/>
               <a:t>We could have adjusted the conversions in the simulation to make it run slower but then the code would formally be wrong, so we decided to keep the code right even if the result doesn’t run at the rhythm it should.</a:t>
             </a:r>
           </a:p>
@@ -6172,15 +6241,7 @@
           <a:p>
             <a:r>
               <a:rPr lang="en-AU" dirty="0"/>
-              <a:t>Create a sensor network with one central sensor, the sink node, that is informed by the rest of the nodes when the </a:t>
-            </a:r>
-            <a:r>
-              <a:rPr lang="en-AU" dirty="0" err="1"/>
-              <a:t>temperture</a:t>
-            </a:r>
-            <a:r>
-              <a:rPr lang="en-AU" dirty="0"/>
-              <a:t> measured by any of them is above a given threshold. The sink node periodically chooses the new threshold and </a:t>
+              <a:t>Create a sensor network with one central sensor, the sink node, that is informed by the rest of the nodes when the temperature measured by any of them is above a given threshold. The sink node periodically chooses the new threshold and </a:t>
             </a:r>
             <a:r>
               <a:rPr lang="en-AU" b="1" dirty="0"/>
@@ -6362,27 +6423,39 @@
           <a:p>
             <a:pPr lvl="1"/>
             <a:r>
-              <a:rPr lang="en-US" dirty="0"/>
-              <a:t>Nodes: where we write information regarding actions that happen on the nodes, like starting/stopping the components, new temperatures read, new threshold calculated, or actions that the nodes have to do, like forwarding</a:t>
-            </a:r>
-          </a:p>
-          <a:p>
-            <a:pPr lvl="1"/>
-            <a:r>
-              <a:rPr lang="en-US" dirty="0"/>
-              <a:t>Radio: we write information regarding the AM Layer, that is: sent, forwarded or received events.</a:t>
-            </a:r>
-          </a:p>
-          <a:p>
-            <a:pPr lvl="1"/>
-            <a:r>
-              <a:rPr lang="en-US" dirty="0"/>
-              <a:t>Errors: for possible errors</a:t>
-            </a:r>
-          </a:p>
-          <a:p>
-            <a:pPr lvl="1"/>
-            <a:endParaRPr lang="en-US" dirty="0"/>
+              <a:rPr lang="en-US" b="1" i="0" dirty="0"/>
+              <a:t>Nodes: </a:t>
+            </a:r>
+            <a:r>
+              <a:rPr lang="en-US" i="0" dirty="0"/>
+              <a:t>where we write information regarding actions that happen on the nodes, like starting/stopping the components, new temperatures read, new threshold calculated, or actions that the nodes have to do, like forwarding</a:t>
+            </a:r>
+          </a:p>
+          <a:p>
+            <a:pPr lvl="1"/>
+            <a:r>
+              <a:rPr lang="en-US" b="1" i="0" dirty="0"/>
+              <a:t>Radio: </a:t>
+            </a:r>
+            <a:r>
+              <a:rPr lang="en-US" i="0" dirty="0"/>
+              <a:t>we write information regarding the AM Layer, that is: sent, forwarded or received events.</a:t>
+            </a:r>
+          </a:p>
+          <a:p>
+            <a:pPr lvl="1"/>
+            <a:r>
+              <a:rPr lang="en-US" b="1" i="0" dirty="0"/>
+              <a:t>Errors: </a:t>
+            </a:r>
+            <a:r>
+              <a:rPr lang="en-US" i="0" dirty="0"/>
+              <a:t>for possible errors</a:t>
+            </a:r>
+          </a:p>
+          <a:p>
+            <a:pPr lvl="1"/>
+            <a:endParaRPr lang="en-US" i="0" dirty="0"/>
           </a:p>
           <a:p>
             <a:r>
@@ -6492,12 +6565,8 @@
           </a:p>
           <a:p>
             <a:r>
-              <a:rPr lang="en-US"/>
-              <a:t>120 </a:t>
-            </a:r>
-            <a:r>
-              <a:rPr lang="en-US" dirty="0"/>
-              <a:t>seconds of simulation (seems a lot but because the simulation on the virtual machine run faster than expected it was the only way of actually making the simulation long enough to see results)</a:t>
+              <a:rPr lang="en-US" dirty="0"/>
+              <a:t>120 seconds of simulation (seems a lot but because the simulation on the virtual machine run faster than expected it was the only way of actually making the simulation long enough to see results)</a:t>
             </a:r>
           </a:p>
           <a:p>
@@ -6604,7 +6673,7 @@
         </p:nvSpPr>
         <p:spPr>
           <a:xfrm>
-            <a:off x="1371600" y="140208"/>
+            <a:off x="1295400" y="25146"/>
             <a:ext cx="9601200" cy="1485900"/>
           </a:xfrm>
         </p:spPr>
@@ -6637,13 +6706,13 @@
         </p:nvSpPr>
         <p:spPr>
           <a:xfrm>
-            <a:off x="1371600" y="1121664"/>
-            <a:ext cx="9601200" cy="5876544"/>
+            <a:off x="768096" y="768096"/>
+            <a:ext cx="11423904" cy="6230112"/>
           </a:xfrm>
         </p:spPr>
         <p:txBody>
           <a:bodyPr>
-            <a:normAutofit fontScale="85000" lnSpcReduction="20000"/>
+            <a:normAutofit fontScale="92500" lnSpcReduction="20000"/>
           </a:bodyPr>
           <a:lstStyle/>
           <a:p>
@@ -6739,30 +6808,30 @@
           <a:p>
             <a:pPr lvl="1"/>
             <a:r>
-              <a:rPr lang="en-US" dirty="0"/>
+              <a:rPr lang="en-US" i="0" dirty="0"/>
               <a:t>The number of SETUP messages sent and DATA </a:t>
             </a:r>
             <a:r>
-              <a:rPr lang="en-US" dirty="0" err="1"/>
+              <a:rPr lang="en-US" i="0" dirty="0" err="1"/>
               <a:t>msgs</a:t>
             </a:r>
             <a:r>
-              <a:rPr lang="en-US" dirty="0"/>
+              <a:rPr lang="en-US" i="0" dirty="0"/>
               <a:t> received by the Sink in the 10 seconds of simulation</a:t>
             </a:r>
           </a:p>
           <a:p>
             <a:pPr lvl="1"/>
             <a:r>
-              <a:rPr lang="en-US" dirty="0"/>
+              <a:rPr lang="en-US" i="0" dirty="0"/>
               <a:t>Total number of </a:t>
             </a:r>
             <a:r>
-              <a:rPr lang="en-US" dirty="0" err="1"/>
+              <a:rPr lang="en-US" i="0" dirty="0" err="1"/>
               <a:t>msgs</a:t>
             </a:r>
             <a:r>
-              <a:rPr lang="en-US" dirty="0"/>
+              <a:rPr lang="en-US" i="0" dirty="0"/>
               <a:t> exchanged in the system in those 10 seconds</a:t>
             </a:r>
           </a:p>
@@ -6779,103 +6848,103 @@
           <a:p>
             <a:pPr lvl="1"/>
             <a:r>
-              <a:rPr lang="en-US" dirty="0"/>
+              <a:rPr lang="en-US" i="0" dirty="0"/>
               <a:t>Total exchanged messages</a:t>
             </a:r>
           </a:p>
           <a:p>
             <a:pPr lvl="1"/>
             <a:r>
-              <a:rPr lang="en-US" dirty="0"/>
+              <a:rPr lang="en-US" i="0" dirty="0"/>
               <a:t>Maximum number of exchanged </a:t>
             </a:r>
             <a:r>
-              <a:rPr lang="en-US" dirty="0" err="1"/>
+              <a:rPr lang="en-US" i="0" dirty="0" err="1"/>
               <a:t>msgs</a:t>
             </a:r>
             <a:r>
-              <a:rPr lang="en-US" dirty="0"/>
+              <a:rPr lang="en-US" i="0" dirty="0"/>
               <a:t> in a 10 s time period</a:t>
             </a:r>
           </a:p>
           <a:p>
             <a:pPr lvl="1"/>
             <a:r>
-              <a:rPr lang="en-US" dirty="0"/>
+              <a:rPr lang="en-US" i="0" dirty="0"/>
               <a:t>Minimum number of exchanged </a:t>
             </a:r>
             <a:r>
-              <a:rPr lang="en-US" dirty="0" err="1"/>
+              <a:rPr lang="en-US" i="0" dirty="0" err="1"/>
               <a:t>msgs</a:t>
             </a:r>
             <a:r>
-              <a:rPr lang="en-US" dirty="0"/>
+              <a:rPr lang="en-US" i="0" dirty="0"/>
               <a:t> in a 10 s time period</a:t>
             </a:r>
           </a:p>
           <a:p>
             <a:pPr lvl="1"/>
             <a:r>
-              <a:rPr lang="en-US" dirty="0"/>
+              <a:rPr lang="en-US" i="0" dirty="0"/>
               <a:t>Average number of exchanged </a:t>
             </a:r>
             <a:r>
-              <a:rPr lang="en-US" dirty="0" err="1"/>
+              <a:rPr lang="en-US" i="0" dirty="0" err="1"/>
               <a:t>msgs</a:t>
             </a:r>
             <a:r>
-              <a:rPr lang="en-US" dirty="0"/>
+              <a:rPr lang="en-US" i="0" dirty="0"/>
               <a:t> in a 10 s time period</a:t>
             </a:r>
           </a:p>
           <a:p>
             <a:pPr lvl="1"/>
             <a:r>
-              <a:rPr lang="en-US" dirty="0"/>
+              <a:rPr lang="en-US" i="0" dirty="0"/>
               <a:t>Total number of SETUP </a:t>
             </a:r>
             <a:r>
-              <a:rPr lang="en-US" dirty="0" err="1"/>
+              <a:rPr lang="en-US" i="0" dirty="0" err="1"/>
               <a:t>msgs</a:t>
             </a:r>
             <a:r>
-              <a:rPr lang="en-US" dirty="0"/>
+              <a:rPr lang="en-US" i="0" dirty="0"/>
               <a:t> sent by Sink</a:t>
             </a:r>
           </a:p>
           <a:p>
             <a:pPr lvl="1"/>
             <a:r>
-              <a:rPr lang="en-US" dirty="0"/>
+              <a:rPr lang="en-US" i="0" dirty="0"/>
               <a:t>Total number of DATA </a:t>
             </a:r>
             <a:r>
-              <a:rPr lang="en-US" dirty="0" err="1"/>
+              <a:rPr lang="en-US" i="0" dirty="0" err="1"/>
               <a:t>msgs</a:t>
             </a:r>
             <a:r>
-              <a:rPr lang="en-US" dirty="0"/>
+              <a:rPr lang="en-US" i="0" dirty="0"/>
               <a:t> received by Sink</a:t>
             </a:r>
           </a:p>
           <a:p>
             <a:pPr lvl="1"/>
             <a:r>
-              <a:rPr lang="en-US" dirty="0"/>
+              <a:rPr lang="en-US" i="0" dirty="0"/>
               <a:t>Total number of temperature measurements </a:t>
             </a:r>
           </a:p>
           <a:p>
             <a:pPr lvl="1"/>
             <a:r>
-              <a:rPr lang="en-US" dirty="0"/>
+              <a:rPr lang="en-US" i="0" dirty="0"/>
               <a:t>Highest recorded temperature</a:t>
             </a:r>
           </a:p>
           <a:p>
             <a:pPr lvl="1"/>
             <a:r>
-              <a:rPr lang="en-US" dirty="0"/>
+              <a:rPr lang="en-US" i="0" dirty="0"/>
               <a:t>Percentage of temperatures above threshold</a:t>
             </a:r>
           </a:p>
@@ -7326,9 +7395,16 @@
             <p:ph idx="1"/>
           </p:nvPr>
         </p:nvSpPr>
-        <p:spPr/>
-        <p:txBody>
-          <a:bodyPr/>
+        <p:spPr>
+          <a:xfrm>
+            <a:off x="1371600" y="1670304"/>
+            <a:ext cx="9601200" cy="4379976"/>
+          </a:xfrm>
+        </p:spPr>
+        <p:txBody>
+          <a:bodyPr>
+            <a:normAutofit lnSpcReduction="10000"/>
+          </a:bodyPr>
           <a:lstStyle/>
           <a:p>
             <a:r>
@@ -7337,92 +7413,136 @@
             </a:r>
           </a:p>
           <a:p>
-            <a:pPr lvl="1"/>
-            <a:r>
-              <a:rPr lang="en-US" dirty="0" err="1"/>
+            <a:pPr lvl="1">
+              <a:lnSpc>
+                <a:spcPct val="150000"/>
+              </a:lnSpc>
+            </a:pPr>
+            <a:r>
+              <a:rPr lang="en-US" b="1" i="0" dirty="0" err="1"/>
               <a:t>TemperatureMonitor.h</a:t>
             </a:r>
             <a:r>
-              <a:rPr lang="en-US" dirty="0"/>
-              <a:t> </a:t>
-            </a:r>
-            <a:r>
-              <a:rPr lang="en-US" dirty="0">
+              <a:rPr lang="en-US" b="1" i="0" dirty="0"/>
+              <a:t>:</a:t>
+            </a:r>
+            <a:r>
+              <a:rPr lang="en-US" i="0" dirty="0">
                 <a:sym typeface="Wingdings" pitchFamily="2" charset="2"/>
               </a:rPr>
-              <a:t> the header</a:t>
-            </a:r>
-          </a:p>
-          <a:p>
-            <a:pPr lvl="1"/>
-            <a:r>
-              <a:rPr lang="en-US" dirty="0" err="1">
+              <a:t> the header</a:t>
+            </a:r>
+          </a:p>
+          <a:p>
+            <a:pPr lvl="1">
+              <a:lnSpc>
+                <a:spcPct val="150000"/>
+              </a:lnSpc>
+            </a:pPr>
+            <a:r>
+              <a:rPr lang="en-US" b="1" i="0" dirty="0" err="1">
                 <a:sym typeface="Wingdings" pitchFamily="2" charset="2"/>
               </a:rPr>
               <a:t>TemperatureMonitorAppC.nc</a:t>
             </a:r>
             <a:r>
-              <a:rPr lang="en-US" dirty="0">
+              <a:rPr lang="en-US" b="1" i="0" dirty="0">
                 <a:sym typeface="Wingdings" pitchFamily="2" charset="2"/>
               </a:rPr>
-              <a:t>   the top level configuration</a:t>
-            </a:r>
-          </a:p>
-          <a:p>
-            <a:pPr lvl="1"/>
-            <a:r>
-              <a:rPr lang="en-US" dirty="0" err="1">
+              <a:t>: </a:t>
+            </a:r>
+            <a:r>
+              <a:rPr lang="en-US" i="0" dirty="0">
+                <a:sym typeface="Wingdings" pitchFamily="2" charset="2"/>
+              </a:rPr>
+              <a:t>the top level configuration</a:t>
+            </a:r>
+          </a:p>
+          <a:p>
+            <a:pPr lvl="1">
+              <a:lnSpc>
+                <a:spcPct val="150000"/>
+              </a:lnSpc>
+            </a:pPr>
+            <a:r>
+              <a:rPr lang="en-US" b="1" i="0" dirty="0" err="1">
                 <a:sym typeface="Wingdings" pitchFamily="2" charset="2"/>
               </a:rPr>
               <a:t>TemperatureMonitorC.nc</a:t>
             </a:r>
             <a:r>
-              <a:rPr lang="en-US" dirty="0">
+              <a:rPr lang="en-US" b="1" i="0" dirty="0">
                 <a:sym typeface="Wingdings" pitchFamily="2" charset="2"/>
               </a:rPr>
-              <a:t>  the main module, includes the actual implementation of all the functionality of the different sensors</a:t>
-            </a:r>
-          </a:p>
-          <a:p>
-            <a:pPr lvl="1"/>
-            <a:r>
-              <a:rPr lang="en-US" dirty="0" err="1">
+              <a:t>: </a:t>
+            </a:r>
+            <a:r>
+              <a:rPr lang="en-US" i="0" dirty="0">
+                <a:sym typeface="Wingdings" pitchFamily="2" charset="2"/>
+              </a:rPr>
+              <a:t>the main module, includes the actual implementation of all the functionality of the different sensors</a:t>
+            </a:r>
+          </a:p>
+          <a:p>
+            <a:pPr lvl="1">
+              <a:lnSpc>
+                <a:spcPct val="150000"/>
+              </a:lnSpc>
+            </a:pPr>
+            <a:r>
+              <a:rPr lang="en-US" b="1" i="0" dirty="0" err="1">
                 <a:sym typeface="Wingdings" pitchFamily="2" charset="2"/>
               </a:rPr>
               <a:t>TemperatureSensorC.nc</a:t>
             </a:r>
             <a:r>
-              <a:rPr lang="en-US" dirty="0">
+              <a:rPr lang="en-US" b="1" i="0" dirty="0">
                 <a:sym typeface="Wingdings" pitchFamily="2" charset="2"/>
               </a:rPr>
-              <a:t>  the top level </a:t>
-            </a:r>
-            <a:r>
-              <a:rPr lang="en-US" b="1" dirty="0">
+              <a:t>: </a:t>
+            </a:r>
+            <a:r>
+              <a:rPr lang="en-US" i="0" dirty="0">
+                <a:sym typeface="Wingdings" pitchFamily="2" charset="2"/>
+              </a:rPr>
+              <a:t>the top level </a:t>
+            </a:r>
+            <a:r>
+              <a:rPr lang="en-US" b="1" i="0" dirty="0">
                 <a:sym typeface="Wingdings" pitchFamily="2" charset="2"/>
               </a:rPr>
               <a:t>generic </a:t>
             </a:r>
             <a:r>
-              <a:rPr lang="en-US" dirty="0">
+              <a:rPr lang="en-US" i="0" dirty="0">
                 <a:sym typeface="Wingdings" pitchFamily="2" charset="2"/>
               </a:rPr>
               <a:t>configuration of a secondary module that is used by the main module to read temperatures. It simulates the functionality of a real temperature sensor.</a:t>
             </a:r>
           </a:p>
           <a:p>
-            <a:pPr lvl="1"/>
-            <a:r>
-              <a:rPr lang="en-US" dirty="0" err="1">
+            <a:pPr lvl="1">
+              <a:lnSpc>
+                <a:spcPct val="150000"/>
+              </a:lnSpc>
+            </a:pPr>
+            <a:r>
+              <a:rPr lang="en-US" b="1" i="0" dirty="0" err="1">
                 <a:sym typeface="Wingdings" pitchFamily="2" charset="2"/>
               </a:rPr>
               <a:t>TemperatureSensorP.nc</a:t>
             </a:r>
             <a:r>
-              <a:rPr lang="en-US" dirty="0">
+              <a:rPr lang="en-US" b="1" i="0" dirty="0">
                 <a:sym typeface="Wingdings" pitchFamily="2" charset="2"/>
               </a:rPr>
-              <a:t>  the implementation of the module</a:t>
+              <a:t>: </a:t>
+            </a:r>
+            <a:r>
+              <a:rPr lang="en-US" i="0" dirty="0">
+                <a:sym typeface="Wingdings" pitchFamily="2" charset="2"/>
+              </a:rPr>
+              <a:t>the implementation of the module</a:t>
             </a:r>
           </a:p>
         </p:txBody>
@@ -7510,70 +7630,95 @@
         </p:spPr>
         <p:txBody>
           <a:bodyPr>
-            <a:normAutofit/>
+            <a:normAutofit lnSpcReduction="10000"/>
           </a:bodyPr>
           <a:lstStyle/>
           <a:p>
+            <a:pPr>
+              <a:lnSpc>
+                <a:spcPct val="150000"/>
+              </a:lnSpc>
+            </a:pPr>
             <a:r>
               <a:rPr lang="en-US" dirty="0"/>
               <a:t>Here we included some important macros:</a:t>
             </a:r>
           </a:p>
           <a:p>
-            <a:pPr lvl="1"/>
-            <a:r>
-              <a:rPr lang="en-US" dirty="0"/>
+            <a:pPr lvl="1">
+              <a:lnSpc>
+                <a:spcPct val="150000"/>
+              </a:lnSpc>
+            </a:pPr>
+            <a:r>
+              <a:rPr lang="en-US" i="0" dirty="0"/>
               <a:t>AM_TEMPERATURE_MONITOR 20 </a:t>
             </a:r>
             <a:r>
-              <a:rPr lang="en-US" dirty="0">
+              <a:rPr lang="en-US" i="0" dirty="0">
                 <a:sym typeface="Wingdings" pitchFamily="2" charset="2"/>
               </a:rPr>
-              <a:t>  ID for the AM Layer that multiplexes access to the radio (to have multiple messages being send and received from many nodes on same radio channel)</a:t>
-            </a:r>
-          </a:p>
-          <a:p>
-            <a:pPr lvl="1"/>
-            <a:r>
-              <a:rPr lang="en-US" dirty="0"/>
+              <a:t>  ID for the AM Layer</a:t>
+            </a:r>
+          </a:p>
+          <a:p>
+            <a:pPr lvl="1">
+              <a:lnSpc>
+                <a:spcPct val="150000"/>
+              </a:lnSpc>
+            </a:pPr>
+            <a:r>
+              <a:rPr lang="en-US" i="0" dirty="0"/>
               <a:t>MAX_TEMP 70 </a:t>
             </a:r>
             <a:r>
-              <a:rPr lang="en-US" dirty="0">
+              <a:rPr lang="en-US" i="0" dirty="0">
                 <a:sym typeface="Wingdings" pitchFamily="2" charset="2"/>
               </a:rPr>
               <a:t> as explained before we assume max temperature is 70ºC</a:t>
             </a:r>
           </a:p>
           <a:p>
-            <a:pPr lvl="1"/>
-            <a:r>
-              <a:rPr lang="en-US" dirty="0"/>
+            <a:pPr lvl="1">
+              <a:lnSpc>
+                <a:spcPct val="150000"/>
+              </a:lnSpc>
+            </a:pPr>
+            <a:r>
+              <a:rPr lang="en-US" i="0" dirty="0"/>
               <a:t>TIMER_SINK_PERIOD 30000 </a:t>
             </a:r>
             <a:r>
-              <a:rPr lang="en-US" dirty="0">
+              <a:rPr lang="en-US" i="0" dirty="0">
                 <a:sym typeface="Wingdings" pitchFamily="2" charset="2"/>
               </a:rPr>
               <a:t> period of time between calculations made by sink node to produce new threshold and send new SETUP message</a:t>
             </a:r>
-            <a:endParaRPr lang="en-US" dirty="0"/>
-          </a:p>
-          <a:p>
-            <a:pPr lvl="1"/>
-            <a:r>
-              <a:rPr lang="en-US" dirty="0"/>
+            <a:endParaRPr lang="en-US" i="0" dirty="0"/>
+          </a:p>
+          <a:p>
+            <a:pPr lvl="1">
+              <a:lnSpc>
+                <a:spcPct val="150000"/>
+              </a:lnSpc>
+            </a:pPr>
+            <a:r>
+              <a:rPr lang="en-US" i="0" dirty="0"/>
               <a:t>TIMER_SENSOR_PERIOD 5000 </a:t>
             </a:r>
             <a:r>
-              <a:rPr lang="en-US" dirty="0">
+              <a:rPr lang="en-US" i="0" dirty="0">
                 <a:sym typeface="Wingdings" pitchFamily="2" charset="2"/>
               </a:rPr>
               <a:t> period at which nodes make temperature measurements </a:t>
             </a:r>
           </a:p>
           <a:p>
-            <a:pPr lvl="2"/>
+            <a:pPr lvl="2">
+              <a:lnSpc>
+                <a:spcPct val="150000"/>
+              </a:lnSpc>
+            </a:pPr>
             <a:r>
               <a:rPr lang="en-US" dirty="0">
                 <a:sym typeface="Wingdings" pitchFamily="2" charset="2"/>
@@ -7582,6 +7727,11 @@
             </a:r>
           </a:p>
           <a:p>
+            <a:pPr>
+              <a:lnSpc>
+                <a:spcPct val="150000"/>
+              </a:lnSpc>
+            </a:pPr>
             <a:r>
               <a:rPr lang="en-US" dirty="0"/>
               <a:t>Message structures for the 2 kind of messages SETUP and DATA</a:t>
@@ -8023,7 +8173,12 @@
             <p:ph type="title"/>
           </p:nvPr>
         </p:nvSpPr>
-        <p:spPr/>
+        <p:spPr>
+          <a:xfrm>
+            <a:off x="1371600" y="0"/>
+            <a:ext cx="9601200" cy="1485900"/>
+          </a:xfrm>
+        </p:spPr>
         <p:txBody>
           <a:bodyPr/>
           <a:lstStyle/>
@@ -8054,16 +8209,21 @@
         </p:nvSpPr>
         <p:spPr>
           <a:xfrm>
-            <a:off x="1371600" y="1432560"/>
-            <a:ext cx="9601200" cy="5181600"/>
+            <a:off x="768096" y="609600"/>
+            <a:ext cx="11423904" cy="6248400"/>
           </a:xfrm>
         </p:spPr>
         <p:txBody>
           <a:bodyPr>
-            <a:normAutofit fontScale="92500" lnSpcReduction="10000"/>
+            <a:normAutofit fontScale="85000" lnSpcReduction="20000"/>
           </a:bodyPr>
           <a:lstStyle/>
           <a:p>
+            <a:pPr>
+              <a:lnSpc>
+                <a:spcPct val="170000"/>
+              </a:lnSpc>
+            </a:pPr>
             <a:r>
               <a:rPr lang="en-US" dirty="0"/>
               <a:t>Top-level configuration: wires the </a:t>
@@ -8078,48 +8238,60 @@
             </a:r>
           </a:p>
           <a:p>
-            <a:pPr lvl="1"/>
-            <a:r>
-              <a:rPr lang="en-US" dirty="0" err="1"/>
+            <a:pPr lvl="1">
+              <a:lnSpc>
+                <a:spcPct val="170000"/>
+              </a:lnSpc>
+            </a:pPr>
+            <a:r>
+              <a:rPr lang="en-US" b="1" i="0" dirty="0" err="1"/>
               <a:t>MainC</a:t>
             </a:r>
             <a:r>
-              <a:rPr lang="en-US" dirty="0"/>
+              <a:rPr lang="en-US" i="0" dirty="0"/>
               <a:t>: used to boot the </a:t>
             </a:r>
             <a:r>
-              <a:rPr lang="en-US" dirty="0" err="1"/>
+              <a:rPr lang="en-US" i="0" dirty="0" err="1"/>
               <a:t>TemperatureMonitor</a:t>
             </a:r>
             <a:r>
-              <a:rPr lang="en-US" dirty="0"/>
+              <a:rPr lang="en-US" i="0" dirty="0"/>
               <a:t> Module</a:t>
             </a:r>
           </a:p>
           <a:p>
-            <a:pPr lvl="1"/>
-            <a:r>
-              <a:rPr lang="en-US" dirty="0"/>
+            <a:pPr lvl="1">
+              <a:lnSpc>
+                <a:spcPct val="170000"/>
+              </a:lnSpc>
+            </a:pPr>
+            <a:r>
+              <a:rPr lang="en-US" i="0" dirty="0"/>
               <a:t>3 </a:t>
             </a:r>
             <a:r>
-              <a:rPr lang="en-US" dirty="0" err="1"/>
+              <a:rPr lang="en-US" b="1" i="0" dirty="0" err="1"/>
               <a:t>TimerMilliC</a:t>
             </a:r>
             <a:r>
-              <a:rPr lang="en-US" dirty="0"/>
+              <a:rPr lang="en-US" i="0" dirty="0"/>
               <a:t> for the 3 timers used by the </a:t>
             </a:r>
             <a:r>
-              <a:rPr lang="en-US" dirty="0" err="1"/>
+              <a:rPr lang="en-US" i="0" dirty="0" err="1"/>
               <a:t>TemperatureMonitor</a:t>
             </a:r>
-            <a:endParaRPr lang="en-US" dirty="0"/>
-          </a:p>
-          <a:p>
-            <a:pPr lvl="2"/>
-            <a:r>
-              <a:rPr lang="en-US" dirty="0" err="1"/>
+            <a:endParaRPr lang="en-US" i="0" dirty="0"/>
+          </a:p>
+          <a:p>
+            <a:pPr lvl="2">
+              <a:lnSpc>
+                <a:spcPct val="170000"/>
+              </a:lnSpc>
+            </a:pPr>
+            <a:r>
+              <a:rPr lang="en-US" b="1" dirty="0" err="1"/>
               <a:t>TimerSink</a:t>
             </a:r>
             <a:r>
@@ -8128,9 +8300,13 @@
             </a:r>
           </a:p>
           <a:p>
-            <a:pPr lvl="2"/>
-            <a:r>
-              <a:rPr lang="en-US" dirty="0" err="1"/>
+            <a:pPr lvl="2">
+              <a:lnSpc>
+                <a:spcPct val="170000"/>
+              </a:lnSpc>
+            </a:pPr>
+            <a:r>
+              <a:rPr lang="en-US" b="1" dirty="0" err="1"/>
               <a:t>TimerSensor</a:t>
             </a:r>
             <a:r>
@@ -8139,113 +8315,138 @@
             </a:r>
           </a:p>
           <a:p>
-            <a:pPr lvl="2"/>
-            <a:r>
-              <a:rPr lang="en-US" dirty="0" err="1"/>
+            <a:pPr lvl="2">
+              <a:lnSpc>
+                <a:spcPct val="170000"/>
+              </a:lnSpc>
+            </a:pPr>
+            <a:r>
+              <a:rPr lang="en-US" b="1" dirty="0" err="1"/>
               <a:t>WaitingTimer</a:t>
             </a:r>
             <a:r>
-              <a:rPr lang="en-US" dirty="0"/>
-              <a:t>: used to make node wait after receiving SETUP message and before forwarding it</a:t>
-            </a:r>
-          </a:p>
-          <a:p>
-            <a:pPr lvl="1"/>
-            <a:r>
-              <a:rPr lang="en-US" dirty="0" err="1"/>
+              <a:rPr lang="en-US" b="1" dirty="0"/>
+              <a:t>: </a:t>
+            </a:r>
+            <a:r>
+              <a:rPr lang="en-US" dirty="0"/>
+              <a:t>used to make node wait after receiving SETUP message and before forwarding it</a:t>
+            </a:r>
+          </a:p>
+          <a:p>
+            <a:pPr lvl="1">
+              <a:lnSpc>
+                <a:spcPct val="170000"/>
+              </a:lnSpc>
+            </a:pPr>
+            <a:r>
+              <a:rPr lang="en-US" b="1" i="0" dirty="0" err="1"/>
               <a:t>AMSenderC</a:t>
             </a:r>
             <a:r>
-              <a:rPr lang="en-US" dirty="0"/>
+              <a:rPr lang="en-US" i="0" dirty="0"/>
               <a:t>: provides the Packet, </a:t>
             </a:r>
             <a:r>
-              <a:rPr lang="en-US" dirty="0" err="1"/>
+              <a:rPr lang="en-US" i="0" dirty="0" err="1"/>
               <a:t>AMPacket</a:t>
             </a:r>
             <a:r>
-              <a:rPr lang="en-US" dirty="0"/>
+              <a:rPr lang="en-US" i="0" dirty="0"/>
               <a:t> and </a:t>
             </a:r>
             <a:r>
-              <a:rPr lang="en-US" dirty="0" err="1"/>
+              <a:rPr lang="en-US" i="0" dirty="0" err="1"/>
               <a:t>AMSend</a:t>
             </a:r>
             <a:r>
-              <a:rPr lang="en-US" dirty="0"/>
+              <a:rPr lang="en-US" i="0" dirty="0"/>
               <a:t> interfaces to access AM message structure and to send messages through the AM layer</a:t>
             </a:r>
           </a:p>
           <a:p>
-            <a:pPr lvl="1"/>
-            <a:r>
-              <a:rPr lang="en-US" dirty="0" err="1"/>
+            <a:pPr lvl="1">
+              <a:lnSpc>
+                <a:spcPct val="170000"/>
+              </a:lnSpc>
+            </a:pPr>
+            <a:r>
+              <a:rPr lang="en-US" b="1" i="0" dirty="0" err="1"/>
               <a:t>AMReceiverC</a:t>
             </a:r>
             <a:r>
-              <a:rPr lang="en-US" dirty="0"/>
+              <a:rPr lang="en-US" i="0" dirty="0"/>
               <a:t>: provides the Receive interface to receive messages</a:t>
             </a:r>
           </a:p>
           <a:p>
-            <a:pPr lvl="1"/>
-            <a:r>
-              <a:rPr lang="en-US" dirty="0" err="1"/>
+            <a:pPr lvl="1">
+              <a:lnSpc>
+                <a:spcPct val="170000"/>
+              </a:lnSpc>
+            </a:pPr>
+            <a:r>
+              <a:rPr lang="en-US" b="1" i="0" dirty="0" err="1"/>
               <a:t>ActiveMessageC</a:t>
             </a:r>
             <a:r>
-              <a:rPr lang="en-US" dirty="0"/>
+              <a:rPr lang="en-US" i="0" dirty="0"/>
               <a:t>: provides the </a:t>
             </a:r>
             <a:r>
-              <a:rPr lang="en-US" dirty="0" err="1"/>
+              <a:rPr lang="en-US" i="0" dirty="0" err="1"/>
               <a:t>SplitControl</a:t>
             </a:r>
             <a:r>
-              <a:rPr lang="en-US" dirty="0"/>
+              <a:rPr lang="en-US" i="0" dirty="0"/>
               <a:t> (called </a:t>
             </a:r>
             <a:r>
-              <a:rPr lang="en-US" dirty="0" err="1"/>
+              <a:rPr lang="en-US" i="0" dirty="0" err="1"/>
               <a:t>AMControl</a:t>
             </a:r>
             <a:r>
-              <a:rPr lang="en-US" dirty="0"/>
+              <a:rPr lang="en-US" i="0" dirty="0"/>
               <a:t> in the </a:t>
             </a:r>
             <a:r>
-              <a:rPr lang="en-US" dirty="0" err="1"/>
+              <a:rPr lang="en-US" i="0" dirty="0" err="1"/>
               <a:t>TemperatureMonitor</a:t>
             </a:r>
             <a:r>
-              <a:rPr lang="en-US" dirty="0"/>
+              <a:rPr lang="en-US" i="0" dirty="0"/>
               <a:t>) to start/stop de AM Layer</a:t>
             </a:r>
           </a:p>
           <a:p>
-            <a:pPr lvl="1"/>
-            <a:r>
-              <a:rPr lang="en-US" dirty="0" err="1"/>
+            <a:pPr lvl="1">
+              <a:lnSpc>
+                <a:spcPct val="170000"/>
+              </a:lnSpc>
+            </a:pPr>
+            <a:r>
+              <a:rPr lang="en-US" b="1" i="0" dirty="0" err="1"/>
               <a:t>TemperatureSensorC</a:t>
             </a:r>
             <a:r>
-              <a:rPr lang="en-US" dirty="0"/>
+              <a:rPr lang="en-US" i="0" dirty="0"/>
               <a:t>: component to measure temperatures, provides the interface necessary to read temperatures</a:t>
             </a:r>
           </a:p>
           <a:p>
-            <a:pPr lvl="1"/>
-            <a:r>
-              <a:rPr lang="en-US" dirty="0" err="1"/>
+            <a:pPr lvl="1">
+              <a:lnSpc>
+                <a:spcPct val="170000"/>
+              </a:lnSpc>
+            </a:pPr>
+            <a:r>
+              <a:rPr lang="en-US" b="1" i="0" dirty="0" err="1"/>
               <a:t>RandomC</a:t>
             </a:r>
             <a:r>
-              <a:rPr lang="en-US" dirty="0"/>
+              <a:rPr lang="en-US" i="0" dirty="0"/>
               <a:t>: to generate random numbers for the threshold calculations</a:t>
             </a:r>
-          </a:p>
-          <a:p>
-            <a:endParaRPr lang="en-US" dirty="0"/>
           </a:p>
         </p:txBody>
       </p:sp>

</xml_diff>